<commit_message>
Aggiunta coordinate nel database
</commit_message>
<xml_diff>
--- a/Documentazione/database.pptx
+++ b/Documentazione/database.pptx
@@ -193,7 +193,7 @@
             <a:fld id="{E36400BA-0FAF-41C7-AD02-864713816CB5}" type="datetimeFigureOut">
               <a:rPr lang="it-IT" smtClean="0"/>
               <a:pPr/>
-              <a:t>01/10/2016</a:t>
+              <a:t>03/10/2016</a:t>
             </a:fld>
             <a:endParaRPr lang="it-IT"/>
           </a:p>
@@ -723,7 +723,7 @@
             <a:fld id="{920B080A-5D88-430C-A764-4252F62C936A}" type="datetimeFigureOut">
               <a:rPr lang="it-IT" smtClean="0"/>
               <a:pPr/>
-              <a:t>01/10/2016</a:t>
+              <a:t>03/10/2016</a:t>
             </a:fld>
             <a:endParaRPr lang="it-IT"/>
           </a:p>
@@ -890,7 +890,7 @@
             <a:fld id="{920B080A-5D88-430C-A764-4252F62C936A}" type="datetimeFigureOut">
               <a:rPr lang="it-IT" smtClean="0"/>
               <a:pPr/>
-              <a:t>01/10/2016</a:t>
+              <a:t>03/10/2016</a:t>
             </a:fld>
             <a:endParaRPr lang="it-IT"/>
           </a:p>
@@ -1067,7 +1067,7 @@
             <a:fld id="{920B080A-5D88-430C-A764-4252F62C936A}" type="datetimeFigureOut">
               <a:rPr lang="it-IT" smtClean="0"/>
               <a:pPr/>
-              <a:t>01/10/2016</a:t>
+              <a:t>03/10/2016</a:t>
             </a:fld>
             <a:endParaRPr lang="it-IT"/>
           </a:p>
@@ -1234,7 +1234,7 @@
             <a:fld id="{920B080A-5D88-430C-A764-4252F62C936A}" type="datetimeFigureOut">
               <a:rPr lang="it-IT" smtClean="0"/>
               <a:pPr/>
-              <a:t>01/10/2016</a:t>
+              <a:t>03/10/2016</a:t>
             </a:fld>
             <a:endParaRPr lang="it-IT"/>
           </a:p>
@@ -1477,7 +1477,7 @@
             <a:fld id="{920B080A-5D88-430C-A764-4252F62C936A}" type="datetimeFigureOut">
               <a:rPr lang="it-IT" smtClean="0"/>
               <a:pPr/>
-              <a:t>01/10/2016</a:t>
+              <a:t>03/10/2016</a:t>
             </a:fld>
             <a:endParaRPr lang="it-IT"/>
           </a:p>
@@ -1762,7 +1762,7 @@
             <a:fld id="{920B080A-5D88-430C-A764-4252F62C936A}" type="datetimeFigureOut">
               <a:rPr lang="it-IT" smtClean="0"/>
               <a:pPr/>
-              <a:t>01/10/2016</a:t>
+              <a:t>03/10/2016</a:t>
             </a:fld>
             <a:endParaRPr lang="it-IT"/>
           </a:p>
@@ -2186,7 +2186,7 @@
             <a:fld id="{920B080A-5D88-430C-A764-4252F62C936A}" type="datetimeFigureOut">
               <a:rPr lang="it-IT" smtClean="0"/>
               <a:pPr/>
-              <a:t>01/10/2016</a:t>
+              <a:t>03/10/2016</a:t>
             </a:fld>
             <a:endParaRPr lang="it-IT"/>
           </a:p>
@@ -2301,7 +2301,7 @@
             <a:fld id="{920B080A-5D88-430C-A764-4252F62C936A}" type="datetimeFigureOut">
               <a:rPr lang="it-IT" smtClean="0"/>
               <a:pPr/>
-              <a:t>01/10/2016</a:t>
+              <a:t>03/10/2016</a:t>
             </a:fld>
             <a:endParaRPr lang="it-IT"/>
           </a:p>
@@ -2393,7 +2393,7 @@
             <a:fld id="{920B080A-5D88-430C-A764-4252F62C936A}" type="datetimeFigureOut">
               <a:rPr lang="it-IT" smtClean="0"/>
               <a:pPr/>
-              <a:t>01/10/2016</a:t>
+              <a:t>03/10/2016</a:t>
             </a:fld>
             <a:endParaRPr lang="it-IT"/>
           </a:p>
@@ -2667,7 +2667,7 @@
             <a:fld id="{920B080A-5D88-430C-A764-4252F62C936A}" type="datetimeFigureOut">
               <a:rPr lang="it-IT" smtClean="0"/>
               <a:pPr/>
-              <a:t>01/10/2016</a:t>
+              <a:t>03/10/2016</a:t>
             </a:fld>
             <a:endParaRPr lang="it-IT"/>
           </a:p>
@@ -2917,7 +2917,7 @@
             <a:fld id="{920B080A-5D88-430C-A764-4252F62C936A}" type="datetimeFigureOut">
               <a:rPr lang="it-IT" smtClean="0"/>
               <a:pPr/>
-              <a:t>01/10/2016</a:t>
+              <a:t>03/10/2016</a:t>
             </a:fld>
             <a:endParaRPr lang="it-IT"/>
           </a:p>
@@ -3127,7 +3127,7 @@
             <a:fld id="{920B080A-5D88-430C-A764-4252F62C936A}" type="datetimeFigureOut">
               <a:rPr lang="it-IT" smtClean="0"/>
               <a:pPr/>
-              <a:t>01/10/2016</a:t>
+              <a:t>03/10/2016</a:t>
             </a:fld>
             <a:endParaRPr lang="it-IT"/>
           </a:p>
@@ -7475,7 +7475,7 @@
         </p:nvCxnSpPr>
         <p:spPr>
           <a:xfrm>
-            <a:off x="1187624" y="1123970"/>
+            <a:off x="537900" y="1123970"/>
             <a:ext cx="0" cy="144016"/>
           </a:xfrm>
           <a:prstGeom prst="line">
@@ -7510,7 +7510,7 @@
         </p:nvSpPr>
         <p:spPr>
           <a:xfrm rot="5400000" flipH="1">
-            <a:off x="1153716" y="1091332"/>
+            <a:off x="503992" y="1091332"/>
             <a:ext cx="72008" cy="72008"/>
           </a:xfrm>
           <a:prstGeom prst="ellipse">
@@ -7558,7 +7558,7 @@
         </p:nvSpPr>
         <p:spPr>
           <a:xfrm>
-            <a:off x="1005508" y="928266"/>
+            <a:off x="360356" y="928266"/>
             <a:ext cx="448940" cy="192360"/>
           </a:xfrm>
           <a:prstGeom prst="rect">
@@ -7913,7 +7913,7 @@
           <a:p>
             <a:r>
               <a:rPr lang="it-IT" sz="650" dirty="0" smtClean="0"/>
-              <a:t>COORDINATES</a:t>
+              <a:t>LATITUDE</a:t>
             </a:r>
             <a:endParaRPr lang="it-IT" sz="650" dirty="0"/>
           </a:p>
@@ -8153,7 +8153,7 @@
         </p:nvCxnSpPr>
         <p:spPr>
           <a:xfrm>
-            <a:off x="3337198" y="1131590"/>
+            <a:off x="3203848" y="1491630"/>
             <a:ext cx="0" cy="144016"/>
           </a:xfrm>
           <a:prstGeom prst="line">
@@ -8188,7 +8188,7 @@
         </p:nvSpPr>
         <p:spPr>
           <a:xfrm rot="5400000" flipH="1">
-            <a:off x="3303290" y="1091332"/>
+            <a:off x="3168416" y="1599070"/>
             <a:ext cx="72008" cy="72008"/>
           </a:xfrm>
           <a:prstGeom prst="ellipse">
@@ -8236,7 +8236,7 @@
         </p:nvSpPr>
         <p:spPr>
           <a:xfrm>
-            <a:off x="3155082" y="928266"/>
+            <a:off x="3035828" y="1649362"/>
             <a:ext cx="448940" cy="192360"/>
           </a:xfrm>
           <a:prstGeom prst="rect">
@@ -8266,7 +8266,7 @@
         </p:nvCxnSpPr>
         <p:spPr>
           <a:xfrm>
-            <a:off x="3737620" y="1137940"/>
+            <a:off x="3219088" y="1137940"/>
             <a:ext cx="0" cy="144016"/>
           </a:xfrm>
           <a:prstGeom prst="line">
@@ -8301,7 +8301,7 @@
         </p:nvSpPr>
         <p:spPr>
           <a:xfrm rot="5400000" flipH="1">
-            <a:off x="3703712" y="1097682"/>
+            <a:off x="3185180" y="1097682"/>
             <a:ext cx="72008" cy="72008"/>
           </a:xfrm>
           <a:prstGeom prst="ellipse">
@@ -8384,7 +8384,7 @@
         </p:nvSpPr>
         <p:spPr>
           <a:xfrm rot="5400000" flipH="1">
-            <a:off x="3823727" y="1601738"/>
+            <a:off x="3819155" y="1601738"/>
             <a:ext cx="72008" cy="72008"/>
           </a:xfrm>
           <a:prstGeom prst="ellipse">
@@ -8432,7 +8432,7 @@
         </p:nvSpPr>
         <p:spPr>
           <a:xfrm>
-            <a:off x="3555504" y="928266"/>
+            <a:off x="3036972" y="928266"/>
             <a:ext cx="648072" cy="192360"/>
           </a:xfrm>
           <a:prstGeom prst="rect">
@@ -8478,7 +8478,7 @@
           <a:p>
             <a:r>
               <a:rPr lang="it-IT" sz="650" dirty="0" smtClean="0"/>
-              <a:t>COORDINATES</a:t>
+              <a:t>LONGITUDE</a:t>
             </a:r>
             <a:endParaRPr lang="it-IT" sz="650" dirty="0"/>
           </a:p>
@@ -10346,7 +10346,7 @@
           <a:p>
             <a:r>
               <a:rPr lang="it-IT" sz="650" dirty="0" smtClean="0"/>
-              <a:t>TYPOLOGY</a:t>
+              <a:t>LONGITUDE</a:t>
             </a:r>
             <a:endParaRPr lang="it-IT" sz="650" dirty="0"/>
           </a:p>
@@ -10459,7 +10459,7 @@
           <a:p>
             <a:r>
               <a:rPr lang="it-IT" sz="650" dirty="0" smtClean="0"/>
-              <a:t>COORDINATES</a:t>
+              <a:t>LATITUDE</a:t>
             </a:r>
             <a:endParaRPr lang="it-IT" sz="650" dirty="0"/>
           </a:p>
@@ -14785,6 +14785,345 @@
             <a:r>
               <a:rPr lang="it-IT" sz="650" dirty="0" smtClean="0"/>
               <a:t>0.1</a:t>
+            </a:r>
+            <a:endParaRPr lang="it-IT" sz="650" dirty="0"/>
+          </a:p>
+        </p:txBody>
+      </p:sp>
+      <p:cxnSp>
+        <p:nvCxnSpPr>
+          <p:cNvPr id="320" name="Connettore 1 319"/>
+          <p:cNvCxnSpPr/>
+          <p:nvPr/>
+        </p:nvCxnSpPr>
+        <p:spPr>
+          <a:xfrm>
+            <a:off x="2555776" y="3651870"/>
+            <a:ext cx="72008" cy="72008"/>
+          </a:xfrm>
+          <a:prstGeom prst="line">
+            <a:avLst/>
+          </a:prstGeom>
+          <a:ln>
+            <a:solidFill>
+              <a:schemeClr val="tx1"/>
+            </a:solidFill>
+          </a:ln>
+        </p:spPr>
+        <p:style>
+          <a:lnRef idx="1">
+            <a:schemeClr val="accent1"/>
+          </a:lnRef>
+          <a:fillRef idx="0">
+            <a:schemeClr val="accent1"/>
+          </a:fillRef>
+          <a:effectRef idx="0">
+            <a:schemeClr val="accent1"/>
+          </a:effectRef>
+          <a:fontRef idx="minor">
+            <a:schemeClr val="tx1"/>
+          </a:fontRef>
+        </p:style>
+      </p:cxnSp>
+      <p:sp>
+        <p:nvSpPr>
+          <p:cNvPr id="321" name="Ovale 320"/>
+          <p:cNvSpPr/>
+          <p:nvPr/>
+        </p:nvSpPr>
+        <p:spPr>
+          <a:xfrm rot="5400000" flipH="1">
+            <a:off x="2511200" y="3593578"/>
+            <a:ext cx="72008" cy="72008"/>
+          </a:xfrm>
+          <a:prstGeom prst="ellipse">
+            <a:avLst/>
+          </a:prstGeom>
+          <a:solidFill>
+            <a:schemeClr val="bg1"/>
+          </a:solidFill>
+          <a:ln w="12700">
+            <a:solidFill>
+              <a:schemeClr val="tx1"/>
+            </a:solidFill>
+          </a:ln>
+        </p:spPr>
+        <p:style>
+          <a:lnRef idx="2">
+            <a:schemeClr val="accent1">
+              <a:shade val="50000"/>
+            </a:schemeClr>
+          </a:lnRef>
+          <a:fillRef idx="1">
+            <a:schemeClr val="accent1"/>
+          </a:fillRef>
+          <a:effectRef idx="0">
+            <a:schemeClr val="accent1"/>
+          </a:effectRef>
+          <a:fontRef idx="minor">
+            <a:schemeClr val="lt1"/>
+          </a:fontRef>
+        </p:style>
+        <p:txBody>
+          <a:bodyPr rtlCol="0" anchor="ctr"/>
+          <a:lstStyle/>
+          <a:p>
+            <a:pPr algn="ctr"/>
+            <a:endParaRPr lang="it-IT" dirty="0"/>
+          </a:p>
+        </p:txBody>
+      </p:sp>
+      <p:sp>
+        <p:nvSpPr>
+          <p:cNvPr id="322" name="CasellaDiTesto 321"/>
+          <p:cNvSpPr txBox="1"/>
+          <p:nvPr/>
+        </p:nvSpPr>
+        <p:spPr>
+          <a:xfrm>
+            <a:off x="2016288" y="3535286"/>
+            <a:ext cx="592956" cy="192360"/>
+          </a:xfrm>
+          <a:prstGeom prst="rect">
+            <a:avLst/>
+          </a:prstGeom>
+          <a:noFill/>
+        </p:spPr>
+        <p:txBody>
+          <a:bodyPr wrap="square" rtlCol="0">
+            <a:spAutoFit/>
+          </a:bodyPr>
+          <a:lstStyle/>
+          <a:p>
+            <a:r>
+              <a:rPr lang="it-IT" sz="650" dirty="0" smtClean="0"/>
+              <a:t>TYPOLOGY</a:t>
+            </a:r>
+            <a:endParaRPr lang="it-IT" sz="650" dirty="0"/>
+          </a:p>
+        </p:txBody>
+      </p:sp>
+      <p:cxnSp>
+        <p:nvCxnSpPr>
+          <p:cNvPr id="323" name="Connettore 1 322"/>
+          <p:cNvCxnSpPr/>
+          <p:nvPr/>
+        </p:nvCxnSpPr>
+        <p:spPr>
+          <a:xfrm>
+            <a:off x="1187624" y="1131590"/>
+            <a:ext cx="0" cy="144016"/>
+          </a:xfrm>
+          <a:prstGeom prst="line">
+            <a:avLst/>
+          </a:prstGeom>
+          <a:ln>
+            <a:solidFill>
+              <a:schemeClr val="tx1"/>
+            </a:solidFill>
+          </a:ln>
+        </p:spPr>
+        <p:style>
+          <a:lnRef idx="1">
+            <a:schemeClr val="accent1"/>
+          </a:lnRef>
+          <a:fillRef idx="0">
+            <a:schemeClr val="accent1"/>
+          </a:fillRef>
+          <a:effectRef idx="0">
+            <a:schemeClr val="accent1"/>
+          </a:effectRef>
+          <a:fontRef idx="minor">
+            <a:schemeClr val="tx1"/>
+          </a:fontRef>
+        </p:style>
+      </p:cxnSp>
+      <p:sp>
+        <p:nvSpPr>
+          <p:cNvPr id="324" name="Ovale 323"/>
+          <p:cNvSpPr/>
+          <p:nvPr/>
+        </p:nvSpPr>
+        <p:spPr>
+          <a:xfrm rot="5400000" flipH="1">
+            <a:off x="1152192" y="1091586"/>
+            <a:ext cx="72008" cy="72008"/>
+          </a:xfrm>
+          <a:prstGeom prst="ellipse">
+            <a:avLst/>
+          </a:prstGeom>
+          <a:solidFill>
+            <a:schemeClr val="bg1"/>
+          </a:solidFill>
+          <a:ln w="12700">
+            <a:solidFill>
+              <a:schemeClr val="tx1"/>
+            </a:solidFill>
+          </a:ln>
+        </p:spPr>
+        <p:style>
+          <a:lnRef idx="2">
+            <a:schemeClr val="accent1">
+              <a:shade val="50000"/>
+            </a:schemeClr>
+          </a:lnRef>
+          <a:fillRef idx="1">
+            <a:schemeClr val="accent1"/>
+          </a:fillRef>
+          <a:effectRef idx="0">
+            <a:schemeClr val="accent1"/>
+          </a:effectRef>
+          <a:fontRef idx="minor">
+            <a:schemeClr val="lt1"/>
+          </a:fontRef>
+        </p:style>
+        <p:txBody>
+          <a:bodyPr rtlCol="0" anchor="ctr"/>
+          <a:lstStyle/>
+          <a:p>
+            <a:pPr algn="ctr"/>
+            <a:endParaRPr lang="it-IT" dirty="0"/>
+          </a:p>
+        </p:txBody>
+      </p:sp>
+      <p:sp>
+        <p:nvSpPr>
+          <p:cNvPr id="325" name="CasellaDiTesto 324"/>
+          <p:cNvSpPr txBox="1"/>
+          <p:nvPr/>
+        </p:nvSpPr>
+        <p:spPr>
+          <a:xfrm>
+            <a:off x="1020748" y="933854"/>
+            <a:ext cx="692522" cy="192360"/>
+          </a:xfrm>
+          <a:prstGeom prst="rect">
+            <a:avLst/>
+          </a:prstGeom>
+          <a:noFill/>
+        </p:spPr>
+        <p:txBody>
+          <a:bodyPr wrap="square" rtlCol="0">
+            <a:spAutoFit/>
+          </a:bodyPr>
+          <a:lstStyle/>
+          <a:p>
+            <a:r>
+              <a:rPr lang="it-IT" sz="650" dirty="0" smtClean="0"/>
+              <a:t>LONGITUDE</a:t>
+            </a:r>
+            <a:endParaRPr lang="it-IT" sz="650" dirty="0"/>
+          </a:p>
+        </p:txBody>
+      </p:sp>
+      <p:cxnSp>
+        <p:nvCxnSpPr>
+          <p:cNvPr id="327" name="Connettore 1 326"/>
+          <p:cNvCxnSpPr/>
+          <p:nvPr/>
+        </p:nvCxnSpPr>
+        <p:spPr>
+          <a:xfrm>
+            <a:off x="3851920" y="1131590"/>
+            <a:ext cx="0" cy="144016"/>
+          </a:xfrm>
+          <a:prstGeom prst="line">
+            <a:avLst/>
+          </a:prstGeom>
+          <a:ln>
+            <a:solidFill>
+              <a:schemeClr val="tx1"/>
+            </a:solidFill>
+          </a:ln>
+        </p:spPr>
+        <p:style>
+          <a:lnRef idx="1">
+            <a:schemeClr val="accent1"/>
+          </a:lnRef>
+          <a:fillRef idx="0">
+            <a:schemeClr val="accent1"/>
+          </a:fillRef>
+          <a:effectRef idx="0">
+            <a:schemeClr val="accent1"/>
+          </a:effectRef>
+          <a:fontRef idx="minor">
+            <a:schemeClr val="tx1"/>
+          </a:fontRef>
+        </p:style>
+      </p:cxnSp>
+      <p:sp>
+        <p:nvSpPr>
+          <p:cNvPr id="329" name="Ovale 328"/>
+          <p:cNvSpPr/>
+          <p:nvPr/>
+        </p:nvSpPr>
+        <p:spPr>
+          <a:xfrm rot="5400000" flipH="1">
+            <a:off x="3815344" y="1099586"/>
+            <a:ext cx="72008" cy="72008"/>
+          </a:xfrm>
+          <a:prstGeom prst="ellipse">
+            <a:avLst/>
+          </a:prstGeom>
+          <a:solidFill>
+            <a:schemeClr val="bg1"/>
+          </a:solidFill>
+          <a:ln w="12700">
+            <a:solidFill>
+              <a:schemeClr val="tx1"/>
+            </a:solidFill>
+          </a:ln>
+        </p:spPr>
+        <p:style>
+          <a:lnRef idx="2">
+            <a:schemeClr val="accent1">
+              <a:shade val="50000"/>
+            </a:schemeClr>
+          </a:lnRef>
+          <a:fillRef idx="1">
+            <a:schemeClr val="accent1"/>
+          </a:fillRef>
+          <a:effectRef idx="0">
+            <a:schemeClr val="accent1"/>
+          </a:effectRef>
+          <a:fontRef idx="minor">
+            <a:schemeClr val="lt1"/>
+          </a:fontRef>
+        </p:style>
+        <p:txBody>
+          <a:bodyPr rtlCol="0" anchor="ctr"/>
+          <a:lstStyle/>
+          <a:p>
+            <a:pPr algn="ctr"/>
+            <a:endParaRPr lang="it-IT" dirty="0"/>
+          </a:p>
+        </p:txBody>
+      </p:sp>
+      <p:sp>
+        <p:nvSpPr>
+          <p:cNvPr id="330" name="CasellaDiTesto 329"/>
+          <p:cNvSpPr txBox="1"/>
+          <p:nvPr/>
+        </p:nvSpPr>
+        <p:spPr>
+          <a:xfrm>
+            <a:off x="3690760" y="928138"/>
+            <a:ext cx="739130" cy="192360"/>
+          </a:xfrm>
+          <a:prstGeom prst="rect">
+            <a:avLst/>
+          </a:prstGeom>
+          <a:noFill/>
+        </p:spPr>
+        <p:txBody>
+          <a:bodyPr wrap="square" rtlCol="0">
+            <a:spAutoFit/>
+          </a:bodyPr>
+          <a:lstStyle/>
+          <a:p>
+            <a:r>
+              <a:rPr lang="it-IT" sz="650" dirty="0" smtClean="0"/>
+              <a:t>LATITUDE</a:t>
             </a:r>
             <a:endParaRPr lang="it-IT" sz="650" dirty="0"/>
           </a:p>

</xml_diff>

<commit_message>
Aggiunta nomi a Achievements e Missioni
</commit_message>
<xml_diff>
--- a/Documentazione/database.pptx
+++ b/Documentazione/database.pptx
@@ -193,7 +193,7 @@
             <a:fld id="{E36400BA-0FAF-41C7-AD02-864713816CB5}" type="datetimeFigureOut">
               <a:rPr lang="it-IT" smtClean="0"/>
               <a:pPr/>
-              <a:t>03/10/2016</a:t>
+              <a:t>05/10/2016</a:t>
             </a:fld>
             <a:endParaRPr lang="it-IT"/>
           </a:p>
@@ -723,7 +723,7 @@
             <a:fld id="{920B080A-5D88-430C-A764-4252F62C936A}" type="datetimeFigureOut">
               <a:rPr lang="it-IT" smtClean="0"/>
               <a:pPr/>
-              <a:t>03/10/2016</a:t>
+              <a:t>05/10/2016</a:t>
             </a:fld>
             <a:endParaRPr lang="it-IT"/>
           </a:p>
@@ -890,7 +890,7 @@
             <a:fld id="{920B080A-5D88-430C-A764-4252F62C936A}" type="datetimeFigureOut">
               <a:rPr lang="it-IT" smtClean="0"/>
               <a:pPr/>
-              <a:t>03/10/2016</a:t>
+              <a:t>05/10/2016</a:t>
             </a:fld>
             <a:endParaRPr lang="it-IT"/>
           </a:p>
@@ -1067,7 +1067,7 @@
             <a:fld id="{920B080A-5D88-430C-A764-4252F62C936A}" type="datetimeFigureOut">
               <a:rPr lang="it-IT" smtClean="0"/>
               <a:pPr/>
-              <a:t>03/10/2016</a:t>
+              <a:t>05/10/2016</a:t>
             </a:fld>
             <a:endParaRPr lang="it-IT"/>
           </a:p>
@@ -1234,7 +1234,7 @@
             <a:fld id="{920B080A-5D88-430C-A764-4252F62C936A}" type="datetimeFigureOut">
               <a:rPr lang="it-IT" smtClean="0"/>
               <a:pPr/>
-              <a:t>03/10/2016</a:t>
+              <a:t>05/10/2016</a:t>
             </a:fld>
             <a:endParaRPr lang="it-IT"/>
           </a:p>
@@ -1477,7 +1477,7 @@
             <a:fld id="{920B080A-5D88-430C-A764-4252F62C936A}" type="datetimeFigureOut">
               <a:rPr lang="it-IT" smtClean="0"/>
               <a:pPr/>
-              <a:t>03/10/2016</a:t>
+              <a:t>05/10/2016</a:t>
             </a:fld>
             <a:endParaRPr lang="it-IT"/>
           </a:p>
@@ -1762,7 +1762,7 @@
             <a:fld id="{920B080A-5D88-430C-A764-4252F62C936A}" type="datetimeFigureOut">
               <a:rPr lang="it-IT" smtClean="0"/>
               <a:pPr/>
-              <a:t>03/10/2016</a:t>
+              <a:t>05/10/2016</a:t>
             </a:fld>
             <a:endParaRPr lang="it-IT"/>
           </a:p>
@@ -2186,7 +2186,7 @@
             <a:fld id="{920B080A-5D88-430C-A764-4252F62C936A}" type="datetimeFigureOut">
               <a:rPr lang="it-IT" smtClean="0"/>
               <a:pPr/>
-              <a:t>03/10/2016</a:t>
+              <a:t>05/10/2016</a:t>
             </a:fld>
             <a:endParaRPr lang="it-IT"/>
           </a:p>
@@ -2301,7 +2301,7 @@
             <a:fld id="{920B080A-5D88-430C-A764-4252F62C936A}" type="datetimeFigureOut">
               <a:rPr lang="it-IT" smtClean="0"/>
               <a:pPr/>
-              <a:t>03/10/2016</a:t>
+              <a:t>05/10/2016</a:t>
             </a:fld>
             <a:endParaRPr lang="it-IT"/>
           </a:p>
@@ -2393,7 +2393,7 @@
             <a:fld id="{920B080A-5D88-430C-A764-4252F62C936A}" type="datetimeFigureOut">
               <a:rPr lang="it-IT" smtClean="0"/>
               <a:pPr/>
-              <a:t>03/10/2016</a:t>
+              <a:t>05/10/2016</a:t>
             </a:fld>
             <a:endParaRPr lang="it-IT"/>
           </a:p>
@@ -2667,7 +2667,7 @@
             <a:fld id="{920B080A-5D88-430C-A764-4252F62C936A}" type="datetimeFigureOut">
               <a:rPr lang="it-IT" smtClean="0"/>
               <a:pPr/>
-              <a:t>03/10/2016</a:t>
+              <a:t>05/10/2016</a:t>
             </a:fld>
             <a:endParaRPr lang="it-IT"/>
           </a:p>
@@ -2917,7 +2917,7 @@
             <a:fld id="{920B080A-5D88-430C-A764-4252F62C936A}" type="datetimeFigureOut">
               <a:rPr lang="it-IT" smtClean="0"/>
               <a:pPr/>
-              <a:t>03/10/2016</a:t>
+              <a:t>05/10/2016</a:t>
             </a:fld>
             <a:endParaRPr lang="it-IT"/>
           </a:p>
@@ -3127,7 +3127,7 @@
             <a:fld id="{920B080A-5D88-430C-A764-4252F62C936A}" type="datetimeFigureOut">
               <a:rPr lang="it-IT" smtClean="0"/>
               <a:pPr/>
-              <a:t>03/10/2016</a:t>
+              <a:t>05/10/2016</a:t>
             </a:fld>
             <a:endParaRPr lang="it-IT"/>
           </a:p>
@@ -14232,7 +14232,7 @@
         </p:nvCxnSpPr>
         <p:spPr>
           <a:xfrm flipH="1">
-            <a:off x="7956376" y="1568804"/>
+            <a:off x="7956376" y="1599142"/>
             <a:ext cx="144016" cy="0"/>
           </a:xfrm>
           <a:prstGeom prst="line">
@@ -14267,7 +14267,7 @@
         </p:nvSpPr>
         <p:spPr>
           <a:xfrm rot="5400000" flipH="1">
-            <a:off x="7920530" y="1532958"/>
+            <a:off x="7920530" y="1558962"/>
             <a:ext cx="72008" cy="72008"/>
           </a:xfrm>
           <a:prstGeom prst="ellipse">
@@ -14315,7 +14315,7 @@
         </p:nvSpPr>
         <p:spPr>
           <a:xfrm>
-            <a:off x="7334134" y="1474282"/>
+            <a:off x="7351470" y="1500286"/>
             <a:ext cx="648072" cy="192360"/>
           </a:xfrm>
           <a:prstGeom prst="rect">
@@ -15690,6 +15690,232 @@
               <a:t>PASSWORD</a:t>
             </a:r>
             <a:endParaRPr lang="it-IT" sz="650" dirty="0"/>
+          </a:p>
+        </p:txBody>
+      </p:sp>
+      <p:cxnSp>
+        <p:nvCxnSpPr>
+          <p:cNvPr id="333" name="Connettore 1 332"/>
+          <p:cNvCxnSpPr/>
+          <p:nvPr/>
+        </p:nvCxnSpPr>
+        <p:spPr>
+          <a:xfrm>
+            <a:off x="7956376" y="3553858"/>
+            <a:ext cx="0" cy="144016"/>
+          </a:xfrm>
+          <a:prstGeom prst="line">
+            <a:avLst/>
+          </a:prstGeom>
+          <a:ln>
+            <a:solidFill>
+              <a:schemeClr val="tx1"/>
+            </a:solidFill>
+          </a:ln>
+        </p:spPr>
+        <p:style>
+          <a:lnRef idx="1">
+            <a:schemeClr val="accent1"/>
+          </a:lnRef>
+          <a:fillRef idx="0">
+            <a:schemeClr val="accent1"/>
+          </a:fillRef>
+          <a:effectRef idx="0">
+            <a:schemeClr val="accent1"/>
+          </a:effectRef>
+          <a:fontRef idx="minor">
+            <a:schemeClr val="tx1"/>
+          </a:fontRef>
+        </p:style>
+      </p:cxnSp>
+      <p:sp>
+        <p:nvSpPr>
+          <p:cNvPr id="340" name="Ovale 339"/>
+          <p:cNvSpPr/>
+          <p:nvPr/>
+        </p:nvSpPr>
+        <p:spPr>
+          <a:xfrm rot="5400000" flipH="1">
+            <a:off x="7919040" y="3512188"/>
+            <a:ext cx="72008" cy="72008"/>
+          </a:xfrm>
+          <a:prstGeom prst="ellipse">
+            <a:avLst/>
+          </a:prstGeom>
+          <a:solidFill>
+            <a:schemeClr val="bg1"/>
+          </a:solidFill>
+          <a:ln w="12700">
+            <a:solidFill>
+              <a:schemeClr val="tx1"/>
+            </a:solidFill>
+          </a:ln>
+        </p:spPr>
+        <p:style>
+          <a:lnRef idx="2">
+            <a:schemeClr val="accent1">
+              <a:shade val="50000"/>
+            </a:schemeClr>
+          </a:lnRef>
+          <a:fillRef idx="1">
+            <a:schemeClr val="accent1"/>
+          </a:fillRef>
+          <a:effectRef idx="0">
+            <a:schemeClr val="accent1"/>
+          </a:effectRef>
+          <a:fontRef idx="minor">
+            <a:schemeClr val="lt1"/>
+          </a:fontRef>
+        </p:style>
+        <p:txBody>
+          <a:bodyPr rtlCol="0" anchor="ctr"/>
+          <a:lstStyle/>
+          <a:p>
+            <a:pPr algn="ctr"/>
+            <a:endParaRPr lang="it-IT" dirty="0"/>
+          </a:p>
+        </p:txBody>
+      </p:sp>
+      <p:sp>
+        <p:nvSpPr>
+          <p:cNvPr id="345" name="CasellaDiTesto 344"/>
+          <p:cNvSpPr txBox="1"/>
+          <p:nvPr/>
+        </p:nvSpPr>
+        <p:spPr>
+          <a:xfrm>
+            <a:off x="7596336" y="3455846"/>
+            <a:ext cx="432048" cy="192360"/>
+          </a:xfrm>
+          <a:prstGeom prst="rect">
+            <a:avLst/>
+          </a:prstGeom>
+          <a:noFill/>
+        </p:spPr>
+        <p:txBody>
+          <a:bodyPr wrap="square" rtlCol="0">
+            <a:spAutoFit/>
+          </a:bodyPr>
+          <a:lstStyle/>
+          <a:p>
+            <a:r>
+              <a:rPr lang="it-IT" sz="650" dirty="0" smtClean="0"/>
+              <a:t>NAME</a:t>
+            </a:r>
+            <a:endParaRPr lang="it-IT" sz="650" dirty="0" smtClean="0"/>
+          </a:p>
+        </p:txBody>
+      </p:sp>
+      <p:cxnSp>
+        <p:nvCxnSpPr>
+          <p:cNvPr id="358" name="Connettore 1 357"/>
+          <p:cNvCxnSpPr/>
+          <p:nvPr/>
+        </p:nvCxnSpPr>
+        <p:spPr>
+          <a:xfrm>
+            <a:off x="7956376" y="1491630"/>
+            <a:ext cx="144016" cy="0"/>
+          </a:xfrm>
+          <a:prstGeom prst="line">
+            <a:avLst/>
+          </a:prstGeom>
+          <a:ln>
+            <a:solidFill>
+              <a:schemeClr val="tx1"/>
+            </a:solidFill>
+          </a:ln>
+        </p:spPr>
+        <p:style>
+          <a:lnRef idx="1">
+            <a:schemeClr val="accent1"/>
+          </a:lnRef>
+          <a:fillRef idx="0">
+            <a:schemeClr val="accent1"/>
+          </a:fillRef>
+          <a:effectRef idx="0">
+            <a:schemeClr val="accent1"/>
+          </a:effectRef>
+          <a:fontRef idx="minor">
+            <a:schemeClr val="tx1"/>
+          </a:fontRef>
+        </p:style>
+      </p:cxnSp>
+      <p:sp>
+        <p:nvSpPr>
+          <p:cNvPr id="374" name="Ovale 373"/>
+          <p:cNvSpPr/>
+          <p:nvPr/>
+        </p:nvSpPr>
+        <p:spPr>
+          <a:xfrm rot="5400000" flipH="1">
+            <a:off x="7919040" y="1449960"/>
+            <a:ext cx="72008" cy="72008"/>
+          </a:xfrm>
+          <a:prstGeom prst="ellipse">
+            <a:avLst/>
+          </a:prstGeom>
+          <a:solidFill>
+            <a:schemeClr val="bg1"/>
+          </a:solidFill>
+          <a:ln w="12700">
+            <a:solidFill>
+              <a:schemeClr val="tx1"/>
+            </a:solidFill>
+          </a:ln>
+        </p:spPr>
+        <p:style>
+          <a:lnRef idx="2">
+            <a:schemeClr val="accent1">
+              <a:shade val="50000"/>
+            </a:schemeClr>
+          </a:lnRef>
+          <a:fillRef idx="1">
+            <a:schemeClr val="accent1"/>
+          </a:fillRef>
+          <a:effectRef idx="0">
+            <a:schemeClr val="accent1"/>
+          </a:effectRef>
+          <a:fontRef idx="minor">
+            <a:schemeClr val="lt1"/>
+          </a:fontRef>
+        </p:style>
+        <p:txBody>
+          <a:bodyPr rtlCol="0" anchor="ctr"/>
+          <a:lstStyle/>
+          <a:p>
+            <a:pPr algn="ctr"/>
+            <a:endParaRPr lang="it-IT" dirty="0"/>
+          </a:p>
+        </p:txBody>
+      </p:sp>
+      <p:sp>
+        <p:nvSpPr>
+          <p:cNvPr id="401" name="CasellaDiTesto 400"/>
+          <p:cNvSpPr txBox="1"/>
+          <p:nvPr/>
+        </p:nvSpPr>
+        <p:spPr>
+          <a:xfrm>
+            <a:off x="7585004" y="1389284"/>
+            <a:ext cx="432048" cy="192360"/>
+          </a:xfrm>
+          <a:prstGeom prst="rect">
+            <a:avLst/>
+          </a:prstGeom>
+          <a:noFill/>
+        </p:spPr>
+        <p:txBody>
+          <a:bodyPr wrap="square" rtlCol="0">
+            <a:spAutoFit/>
+          </a:bodyPr>
+          <a:lstStyle/>
+          <a:p>
+            <a:r>
+              <a:rPr lang="it-IT" sz="650" dirty="0" smtClean="0"/>
+              <a:t>NAME</a:t>
+            </a:r>
+            <a:endParaRPr lang="it-IT" sz="650" dirty="0" smtClean="0"/>
           </a:p>
         </p:txBody>
       </p:sp>

</xml_diff>

<commit_message>
Aggiunta percorsi nel DB
</commit_message>
<xml_diff>
--- a/Documentazione/database.pptx
+++ b/Documentazione/database.pptx
@@ -193,7 +193,7 @@
             <a:fld id="{E36400BA-0FAF-41C7-AD02-864713816CB5}" type="datetimeFigureOut">
               <a:rPr lang="it-IT" smtClean="0"/>
               <a:pPr/>
-              <a:t>01/11/2016</a:t>
+              <a:t>10/11/2016</a:t>
             </a:fld>
             <a:endParaRPr lang="it-IT"/>
           </a:p>
@@ -723,7 +723,7 @@
             <a:fld id="{920B080A-5D88-430C-A764-4252F62C936A}" type="datetimeFigureOut">
               <a:rPr lang="it-IT" smtClean="0"/>
               <a:pPr/>
-              <a:t>01/11/2016</a:t>
+              <a:t>10/11/2016</a:t>
             </a:fld>
             <a:endParaRPr lang="it-IT"/>
           </a:p>
@@ -890,7 +890,7 @@
             <a:fld id="{920B080A-5D88-430C-A764-4252F62C936A}" type="datetimeFigureOut">
               <a:rPr lang="it-IT" smtClean="0"/>
               <a:pPr/>
-              <a:t>01/11/2016</a:t>
+              <a:t>10/11/2016</a:t>
             </a:fld>
             <a:endParaRPr lang="it-IT"/>
           </a:p>
@@ -1067,7 +1067,7 @@
             <a:fld id="{920B080A-5D88-430C-A764-4252F62C936A}" type="datetimeFigureOut">
               <a:rPr lang="it-IT" smtClean="0"/>
               <a:pPr/>
-              <a:t>01/11/2016</a:t>
+              <a:t>10/11/2016</a:t>
             </a:fld>
             <a:endParaRPr lang="it-IT"/>
           </a:p>
@@ -1234,7 +1234,7 @@
             <a:fld id="{920B080A-5D88-430C-A764-4252F62C936A}" type="datetimeFigureOut">
               <a:rPr lang="it-IT" smtClean="0"/>
               <a:pPr/>
-              <a:t>01/11/2016</a:t>
+              <a:t>10/11/2016</a:t>
             </a:fld>
             <a:endParaRPr lang="it-IT"/>
           </a:p>
@@ -1477,7 +1477,7 @@
             <a:fld id="{920B080A-5D88-430C-A764-4252F62C936A}" type="datetimeFigureOut">
               <a:rPr lang="it-IT" smtClean="0"/>
               <a:pPr/>
-              <a:t>01/11/2016</a:t>
+              <a:t>10/11/2016</a:t>
             </a:fld>
             <a:endParaRPr lang="it-IT"/>
           </a:p>
@@ -1762,7 +1762,7 @@
             <a:fld id="{920B080A-5D88-430C-A764-4252F62C936A}" type="datetimeFigureOut">
               <a:rPr lang="it-IT" smtClean="0"/>
               <a:pPr/>
-              <a:t>01/11/2016</a:t>
+              <a:t>10/11/2016</a:t>
             </a:fld>
             <a:endParaRPr lang="it-IT"/>
           </a:p>
@@ -2186,7 +2186,7 @@
             <a:fld id="{920B080A-5D88-430C-A764-4252F62C936A}" type="datetimeFigureOut">
               <a:rPr lang="it-IT" smtClean="0"/>
               <a:pPr/>
-              <a:t>01/11/2016</a:t>
+              <a:t>10/11/2016</a:t>
             </a:fld>
             <a:endParaRPr lang="it-IT"/>
           </a:p>
@@ -2301,7 +2301,7 @@
             <a:fld id="{920B080A-5D88-430C-A764-4252F62C936A}" type="datetimeFigureOut">
               <a:rPr lang="it-IT" smtClean="0"/>
               <a:pPr/>
-              <a:t>01/11/2016</a:t>
+              <a:t>10/11/2016</a:t>
             </a:fld>
             <a:endParaRPr lang="it-IT"/>
           </a:p>
@@ -2393,7 +2393,7 @@
             <a:fld id="{920B080A-5D88-430C-A764-4252F62C936A}" type="datetimeFigureOut">
               <a:rPr lang="it-IT" smtClean="0"/>
               <a:pPr/>
-              <a:t>01/11/2016</a:t>
+              <a:t>10/11/2016</a:t>
             </a:fld>
             <a:endParaRPr lang="it-IT"/>
           </a:p>
@@ -2667,7 +2667,7 @@
             <a:fld id="{920B080A-5D88-430C-A764-4252F62C936A}" type="datetimeFigureOut">
               <a:rPr lang="it-IT" smtClean="0"/>
               <a:pPr/>
-              <a:t>01/11/2016</a:t>
+              <a:t>10/11/2016</a:t>
             </a:fld>
             <a:endParaRPr lang="it-IT"/>
           </a:p>
@@ -2917,7 +2917,7 @@
             <a:fld id="{920B080A-5D88-430C-A764-4252F62C936A}" type="datetimeFigureOut">
               <a:rPr lang="it-IT" smtClean="0"/>
               <a:pPr/>
-              <a:t>01/11/2016</a:t>
+              <a:t>10/11/2016</a:t>
             </a:fld>
             <a:endParaRPr lang="it-IT"/>
           </a:p>
@@ -3127,7 +3127,7 @@
             <a:fld id="{920B080A-5D88-430C-A764-4252F62C936A}" type="datetimeFigureOut">
               <a:rPr lang="it-IT" smtClean="0"/>
               <a:pPr/>
-              <a:t>01/11/2016</a:t>
+              <a:t>10/11/2016</a:t>
             </a:fld>
             <a:endParaRPr lang="it-IT"/>
           </a:p>
@@ -15573,13 +15573,15 @@
       <p:cxnSp>
         <p:nvCxnSpPr>
           <p:cNvPr id="439" name="Connettore 1 438"/>
-          <p:cNvCxnSpPr/>
+          <p:cNvCxnSpPr>
+            <a:endCxn id="442" idx="6"/>
+          </p:cNvCxnSpPr>
           <p:nvPr/>
         </p:nvCxnSpPr>
         <p:spPr>
           <a:xfrm>
             <a:off x="3419872" y="3939902"/>
-            <a:ext cx="72008" cy="144016"/>
+            <a:ext cx="14934" cy="118988"/>
           </a:xfrm>
           <a:prstGeom prst="line">
             <a:avLst/>
@@ -15613,7 +15615,7 @@
         </p:nvSpPr>
         <p:spPr>
           <a:xfrm rot="5400000" flipH="1">
-            <a:off x="3454296" y="4058890"/>
+            <a:off x="3398802" y="4058890"/>
             <a:ext cx="72008" cy="72008"/>
           </a:xfrm>
           <a:prstGeom prst="ellipse">
@@ -15661,7 +15663,7 @@
         </p:nvSpPr>
         <p:spPr>
           <a:xfrm>
-            <a:off x="3360364" y="4102710"/>
+            <a:off x="3315539" y="4102710"/>
             <a:ext cx="592956" cy="192360"/>
           </a:xfrm>
           <a:prstGeom prst="rect">
@@ -15678,6 +15680,119 @@
             <a:r>
               <a:rPr lang="it-IT" sz="650" dirty="0" smtClean="0"/>
               <a:t>REGION</a:t>
+            </a:r>
+            <a:endParaRPr lang="it-IT" sz="650" dirty="0"/>
+          </a:p>
+        </p:txBody>
+      </p:sp>
+      <p:cxnSp>
+        <p:nvCxnSpPr>
+          <p:cNvPr id="435" name="Connettore 1 434"/>
+          <p:cNvCxnSpPr/>
+          <p:nvPr/>
+        </p:nvCxnSpPr>
+        <p:spPr>
+          <a:xfrm>
+            <a:off x="3419872" y="3939902"/>
+            <a:ext cx="144016" cy="144016"/>
+          </a:xfrm>
+          <a:prstGeom prst="line">
+            <a:avLst/>
+          </a:prstGeom>
+          <a:ln>
+            <a:solidFill>
+              <a:schemeClr val="tx1"/>
+            </a:solidFill>
+          </a:ln>
+        </p:spPr>
+        <p:style>
+          <a:lnRef idx="1">
+            <a:schemeClr val="accent1"/>
+          </a:lnRef>
+          <a:fillRef idx="0">
+            <a:schemeClr val="accent1"/>
+          </a:fillRef>
+          <a:effectRef idx="0">
+            <a:schemeClr val="accent1"/>
+          </a:effectRef>
+          <a:fontRef idx="minor">
+            <a:schemeClr val="tx1"/>
+          </a:fontRef>
+        </p:style>
+      </p:cxnSp>
+      <p:sp>
+        <p:nvSpPr>
+          <p:cNvPr id="438" name="Ovale 437"/>
+          <p:cNvSpPr/>
+          <p:nvPr/>
+        </p:nvSpPr>
+        <p:spPr>
+          <a:xfrm rot="5400000" flipH="1">
+            <a:off x="3542818" y="4058634"/>
+            <a:ext cx="72008" cy="72008"/>
+          </a:xfrm>
+          <a:prstGeom prst="ellipse">
+            <a:avLst/>
+          </a:prstGeom>
+          <a:solidFill>
+            <a:schemeClr val="bg1"/>
+          </a:solidFill>
+          <a:ln w="12700">
+            <a:solidFill>
+              <a:schemeClr val="tx1"/>
+            </a:solidFill>
+          </a:ln>
+        </p:spPr>
+        <p:style>
+          <a:lnRef idx="2">
+            <a:schemeClr val="accent1">
+              <a:shade val="50000"/>
+            </a:schemeClr>
+          </a:lnRef>
+          <a:fillRef idx="1">
+            <a:schemeClr val="accent1"/>
+          </a:fillRef>
+          <a:effectRef idx="0">
+            <a:schemeClr val="accent1"/>
+          </a:effectRef>
+          <a:fontRef idx="minor">
+            <a:schemeClr val="lt1"/>
+          </a:fontRef>
+        </p:style>
+        <p:txBody>
+          <a:bodyPr rtlCol="0" anchor="ctr"/>
+          <a:lstStyle/>
+          <a:p>
+            <a:pPr algn="ctr"/>
+            <a:endParaRPr lang="it-IT" dirty="0"/>
+          </a:p>
+        </p:txBody>
+      </p:sp>
+      <p:sp>
+        <p:nvSpPr>
+          <p:cNvPr id="440" name="CasellaDiTesto 439"/>
+          <p:cNvSpPr txBox="1"/>
+          <p:nvPr/>
+        </p:nvSpPr>
+        <p:spPr>
+          <a:xfrm>
+            <a:off x="3572565" y="4002945"/>
+            <a:ext cx="592956" cy="192360"/>
+          </a:xfrm>
+          <a:prstGeom prst="rect">
+            <a:avLst/>
+          </a:prstGeom>
+          <a:noFill/>
+        </p:spPr>
+        <p:txBody>
+          <a:bodyPr wrap="square" rtlCol="0">
+            <a:spAutoFit/>
+          </a:bodyPr>
+          <a:lstStyle/>
+          <a:p>
+            <a:r>
+              <a:rPr lang="it-IT" sz="650" dirty="0" smtClean="0"/>
+              <a:t>ROUTE</a:t>
             </a:r>
             <a:endParaRPr lang="it-IT" sz="650" dirty="0"/>
           </a:p>

</xml_diff>